<commit_message>
What is PSO? (intro ans inspiration added)
</commit_message>
<xml_diff>
--- a/Presentation (interim demo).pptx
+++ b/Presentation (interim demo).pptx
@@ -3372,10 +3372,222 @@
         </p:nvSpPr>
         <p:spPr/>
         <p:txBody>
-          <a:bodyPr/>
-          <a:lstStyle/>
-          <a:p>
-            <a:endParaRPr lang="en-US" dirty="0"/>
+          <a:bodyPr>
+            <a:normAutofit/>
+          </a:bodyPr>
+          <a:lstStyle/>
+          <a:p>
+            <a:pPr lvl="1"/>
+            <a:r>
+              <a:rPr lang="en-US" dirty="0">
+                <a:latin typeface="Times New Roman" pitchFamily="18" charset="0"/>
+                <a:cs typeface="Times New Roman" pitchFamily="18" charset="0"/>
+              </a:rPr>
+              <a:t>A population based </a:t>
+            </a:r>
+            <a:r>
+              <a:rPr lang="en-US" dirty="0" smtClean="0">
+                <a:latin typeface="Times New Roman" pitchFamily="18" charset="0"/>
+                <a:cs typeface="Times New Roman" pitchFamily="18" charset="0"/>
+              </a:rPr>
+              <a:t>stochastic </a:t>
+            </a:r>
+            <a:r>
+              <a:rPr lang="en-US" dirty="0">
+                <a:latin typeface="Times New Roman" pitchFamily="18" charset="0"/>
+                <a:cs typeface="Times New Roman" pitchFamily="18" charset="0"/>
+              </a:rPr>
+              <a:t>algorithm </a:t>
+            </a:r>
+            <a:r>
+              <a:rPr lang="en-US" dirty="0" smtClean="0">
+                <a:latin typeface="Times New Roman" pitchFamily="18" charset="0"/>
+                <a:cs typeface="Times New Roman" pitchFamily="18" charset="0"/>
+              </a:rPr>
+              <a:t>based </a:t>
+            </a:r>
+            <a:r>
+              <a:rPr lang="en-US" dirty="0">
+                <a:latin typeface="Times New Roman" pitchFamily="18" charset="0"/>
+                <a:cs typeface="Times New Roman" pitchFamily="18" charset="0"/>
+              </a:rPr>
+              <a:t>on </a:t>
+            </a:r>
+            <a:r>
+              <a:rPr lang="en-US" dirty="0" err="1">
+                <a:latin typeface="Times New Roman" pitchFamily="18" charset="0"/>
+                <a:cs typeface="Times New Roman" pitchFamily="18" charset="0"/>
+              </a:rPr>
+              <a:t>metaheuristic</a:t>
+            </a:r>
+            <a:r>
+              <a:rPr lang="en-US" dirty="0">
+                <a:latin typeface="Times New Roman" pitchFamily="18" charset="0"/>
+                <a:cs typeface="Times New Roman" pitchFamily="18" charset="0"/>
+              </a:rPr>
+              <a:t> </a:t>
+            </a:r>
+            <a:r>
+              <a:rPr lang="en-US" dirty="0" smtClean="0">
+                <a:latin typeface="Times New Roman" pitchFamily="18" charset="0"/>
+                <a:cs typeface="Times New Roman" pitchFamily="18" charset="0"/>
+              </a:rPr>
+              <a:t>approach.</a:t>
+            </a:r>
+          </a:p>
+          <a:p>
+            <a:pPr lvl="1"/>
+            <a:r>
+              <a:rPr lang="en-US" dirty="0" smtClean="0">
+                <a:latin typeface="Times New Roman" pitchFamily="18" charset="0"/>
+                <a:cs typeface="Times New Roman" pitchFamily="18" charset="0"/>
+              </a:rPr>
+              <a:t>Used in numerical </a:t>
+            </a:r>
+            <a:r>
+              <a:rPr lang="en-US" dirty="0">
+                <a:latin typeface="Times New Roman" pitchFamily="18" charset="0"/>
+                <a:cs typeface="Times New Roman" pitchFamily="18" charset="0"/>
+              </a:rPr>
+              <a:t>optimization </a:t>
+            </a:r>
+            <a:r>
+              <a:rPr lang="en-US" dirty="0" smtClean="0">
+                <a:latin typeface="Times New Roman" pitchFamily="18" charset="0"/>
+                <a:cs typeface="Times New Roman" pitchFamily="18" charset="0"/>
+              </a:rPr>
+              <a:t>problems.</a:t>
+            </a:r>
+          </a:p>
+          <a:p>
+            <a:pPr lvl="1"/>
+            <a:r>
+              <a:rPr lang="en-US" dirty="0" smtClean="0">
+                <a:latin typeface="Times New Roman" pitchFamily="18" charset="0"/>
+                <a:cs typeface="Times New Roman" pitchFamily="18" charset="0"/>
+              </a:rPr>
+              <a:t>An inspiration from </a:t>
+            </a:r>
+            <a:r>
+              <a:rPr lang="en-US" dirty="0">
+                <a:latin typeface="Times New Roman" pitchFamily="18" charset="0"/>
+                <a:cs typeface="Times New Roman" pitchFamily="18" charset="0"/>
+              </a:rPr>
+              <a:t>social foraging behaviors of </a:t>
+            </a:r>
+            <a:r>
+              <a:rPr lang="en-US" dirty="0" smtClean="0">
+                <a:latin typeface="Times New Roman" pitchFamily="18" charset="0"/>
+                <a:cs typeface="Times New Roman" pitchFamily="18" charset="0"/>
+              </a:rPr>
+              <a:t>animals..</a:t>
+            </a:r>
+            <a:endParaRPr lang="en-US" dirty="0">
+              <a:latin typeface="Times New Roman" pitchFamily="18" charset="0"/>
+              <a:cs typeface="Times New Roman" pitchFamily="18" charset="0"/>
+            </a:endParaRPr>
+          </a:p>
+          <a:p>
+            <a:pPr lvl="1"/>
+            <a:r>
+              <a:rPr lang="en-US" dirty="0">
+                <a:latin typeface="Times New Roman" pitchFamily="18" charset="0"/>
+                <a:cs typeface="Times New Roman" pitchFamily="18" charset="0"/>
+              </a:rPr>
+              <a:t>A</a:t>
+            </a:r>
+            <a:r>
+              <a:rPr lang="en-US" dirty="0" smtClean="0">
+                <a:latin typeface="Times New Roman" pitchFamily="18" charset="0"/>
+                <a:cs typeface="Times New Roman" pitchFamily="18" charset="0"/>
+              </a:rPr>
+              <a:t>lso </a:t>
+            </a:r>
+            <a:r>
+              <a:rPr lang="en-US" dirty="0">
+                <a:latin typeface="Times New Roman" pitchFamily="18" charset="0"/>
+                <a:cs typeface="Times New Roman" pitchFamily="18" charset="0"/>
+              </a:rPr>
+              <a:t>classified as swarm intelligence algorithm </a:t>
+            </a:r>
+            <a:r>
+              <a:rPr lang="en-US" dirty="0" smtClean="0">
+                <a:latin typeface="Times New Roman" pitchFamily="18" charset="0"/>
+                <a:cs typeface="Times New Roman" pitchFamily="18" charset="0"/>
+              </a:rPr>
+              <a:t>like,</a:t>
+            </a:r>
+          </a:p>
+          <a:p>
+            <a:pPr lvl="2"/>
+            <a:r>
+              <a:rPr lang="en-US" sz="2000" dirty="0" smtClean="0">
+                <a:latin typeface="Times New Roman" pitchFamily="18" charset="0"/>
+                <a:cs typeface="Times New Roman" pitchFamily="18" charset="0"/>
+              </a:rPr>
+              <a:t>bacterial </a:t>
+            </a:r>
+            <a:r>
+              <a:rPr lang="en-US" sz="2000" dirty="0">
+                <a:latin typeface="Times New Roman" pitchFamily="18" charset="0"/>
+                <a:cs typeface="Times New Roman" pitchFamily="18" charset="0"/>
+              </a:rPr>
+              <a:t>foraging </a:t>
+            </a:r>
+            <a:r>
+              <a:rPr lang="en-US" sz="2000" dirty="0" smtClean="0">
+                <a:latin typeface="Times New Roman" pitchFamily="18" charset="0"/>
+                <a:cs typeface="Times New Roman" pitchFamily="18" charset="0"/>
+              </a:rPr>
+              <a:t>algorithm</a:t>
+            </a:r>
+          </a:p>
+          <a:p>
+            <a:pPr lvl="2"/>
+            <a:r>
+              <a:rPr lang="en-US" sz="2000" dirty="0" smtClean="0">
+                <a:latin typeface="Times New Roman" pitchFamily="18" charset="0"/>
+                <a:cs typeface="Times New Roman" pitchFamily="18" charset="0"/>
+              </a:rPr>
+              <a:t>ant </a:t>
+            </a:r>
+            <a:r>
+              <a:rPr lang="en-US" sz="2000" dirty="0">
+                <a:latin typeface="Times New Roman" pitchFamily="18" charset="0"/>
+                <a:cs typeface="Times New Roman" pitchFamily="18" charset="0"/>
+              </a:rPr>
+              <a:t>colony algorithm etc.</a:t>
+            </a:r>
+          </a:p>
+          <a:p>
+            <a:pPr lvl="1"/>
+            <a:r>
+              <a:rPr lang="en-US" dirty="0" smtClean="0">
+                <a:latin typeface="Times New Roman" pitchFamily="18" charset="0"/>
+                <a:cs typeface="Times New Roman" pitchFamily="18" charset="0"/>
+              </a:rPr>
+              <a:t>Example</a:t>
+            </a:r>
+            <a:r>
+              <a:rPr lang="en-US" dirty="0">
+                <a:latin typeface="Times New Roman" pitchFamily="18" charset="0"/>
+                <a:cs typeface="Times New Roman" pitchFamily="18" charset="0"/>
+              </a:rPr>
+              <a:t>: predicting score of a football team using a math equation.</a:t>
+            </a:r>
+          </a:p>
+          <a:p>
+            <a:pPr lvl="1"/>
+            <a:endParaRPr lang="en-US" dirty="0">
+              <a:latin typeface="Times New Roman" pitchFamily="18" charset="0"/>
+              <a:cs typeface="Times New Roman" pitchFamily="18" charset="0"/>
+            </a:endParaRPr>
+          </a:p>
+          <a:p>
+            <a:endParaRPr lang="en-US" sz="2000" dirty="0">
+              <a:latin typeface="Times New Roman" pitchFamily="18" charset="0"/>
+              <a:cs typeface="Times New Roman" pitchFamily="18" charset="0"/>
+            </a:endParaRPr>
           </a:p>
         </p:txBody>
       </p:sp>
@@ -3512,14 +3724,7 @@
                 <a:latin typeface="Times New Roman" pitchFamily="18" charset="0"/>
                 <a:cs typeface="Times New Roman" pitchFamily="18" charset="0"/>
               </a:rPr>
-              <a:t>Theoretical Analysis (</a:t>
-            </a:r>
-            <a:r>
-              <a:rPr lang="en-US" sz="3600" dirty="0" smtClean="0">
-                <a:latin typeface="Times New Roman" pitchFamily="18" charset="0"/>
-                <a:cs typeface="Times New Roman" pitchFamily="18" charset="0"/>
-              </a:rPr>
-              <a:t>time complexity)</a:t>
+              <a:t>Theoretical Analysis (time complexity)</a:t>
             </a:r>
             <a:endParaRPr lang="en-US" sz="3600" dirty="0">
               <a:latin typeface="Times New Roman" pitchFamily="18" charset="0"/>

</xml_diff>